<commit_message>
- week 10 lecture 2 and 3. - week 2 fine-tuning.
</commit_message>
<xml_diff>
--- a/lectures/week4/lecture2/slides/week4_lecture2.pptx
+++ b/lectures/week4/lecture2/slides/week4_lecture2.pptx
@@ -17,7 +17,7 @@
     <p:sldId id="265" r:id="rId11"/>
     <p:sldId id="267" r:id="rId12"/>
     <p:sldId id="324" r:id="rId13"/>
-    <p:sldId id="260" r:id="rId14"/>
+    <p:sldId id="329" r:id="rId14"/>
   </p:sldIdLst>
   <p:sldSz cx="12192000" cy="6858000"/>
   <p:notesSz cx="6858000" cy="9144000"/>
@@ -2330,49 +2330,13 @@
         <p:spPr/>
         <p:txBody>
           <a:bodyPr>
-            <a:normAutofit fontScale="90000"/>
+            <a:normAutofit/>
           </a:bodyPr>
           <a:lstStyle/>
           <a:p>
             <a:r>
               <a:rPr lang="en-US" dirty="0"/>
-              <a:t>functions</a:t>
-            </a:r>
-            <a:r>
-              <a:rPr lang="en-US" dirty="0">
-                <a:solidFill>
-                  <a:schemeClr val="accent2"/>
-                </a:solidFill>
-              </a:rPr>
-              <a:t>,</a:t>
-            </a:r>
-            <a:r>
-              <a:rPr lang="en-US" dirty="0"/>
-              <a:t> input </a:t>
-            </a:r>
-            <a:r>
-              <a:rPr lang="en-US" dirty="0">
-                <a:solidFill>
-                  <a:schemeClr val="accent6"/>
-                </a:solidFill>
-              </a:rPr>
-              <a:t>&amp;</a:t>
-            </a:r>
-            <a:r>
-              <a:rPr lang="en-US" dirty="0"/>
-              <a:t> output</a:t>
-            </a:r>
-            <a:r>
-              <a:rPr lang="en-US" dirty="0">
-                <a:solidFill>
-                  <a:schemeClr val="accent2"/>
-                </a:solidFill>
-              </a:rPr>
-              <a:t>,</a:t>
-            </a:r>
-            <a:r>
-              <a:rPr lang="en-US" dirty="0"/>
-              <a:t> importing modules</a:t>
+              <a:t>more while loops</a:t>
             </a:r>
             <a:r>
               <a:rPr lang="en-US" dirty="0">
@@ -2440,7 +2404,7 @@
                   <a:schemeClr val="accent6"/>
                 </a:solidFill>
               </a:rPr>
-              <a:t>1 </a:t>
+              <a:t>2 </a:t>
             </a:r>
             <a:r>
               <a:rPr lang="en-US" dirty="0">
@@ -2468,7 +2432,7 @@
                   <a:schemeClr val="accent6"/>
                 </a:solidFill>
               </a:rPr>
-              <a:t>1</a:t>
+              <a:t>2</a:t>
             </a:r>
             <a:r>
               <a:rPr lang="en-US" dirty="0">
@@ -2484,7 +2448,7 @@
     </p:spTree>
     <p:extLst>
       <p:ext uri="{BB962C8B-B14F-4D97-AF65-F5344CB8AC3E}">
-        <p14:creationId xmlns:p14="http://schemas.microsoft.com/office/powerpoint/2010/main" val="72351482"/>
+        <p14:creationId xmlns:p14="http://schemas.microsoft.com/office/powerpoint/2010/main" val="3381914804"/>
       </p:ext>
     </p:extLst>
   </p:cSld>

</xml_diff>